<commit_message>
adding experimental results and results.tex
</commit_message>
<xml_diff>
--- a/Draft/ASE_2017/ppt.pptx
+++ b/Draft/ASE_2017/ppt.pptx
@@ -18,7 +18,7 @@
     <p:sldId id="259" r:id="rId6"/>
   </p:sldIdLst>
   <p:sldSz cx="12192000" cy="6858000"/>
-  <p:notesSz cx="7315200" cy="9601200"/>
+  <p:notesSz cx="6797675" cy="9872663"/>
   <p:defaultTextStyle>
     <a:defPPr>
       <a:defRPr lang="en-US"/>
@@ -160,8 +160,8 @@
         </p:nvSpPr>
         <p:spPr>
           <a:xfrm>
-            <a:off x="0" y="0"/>
-            <a:ext cx="3170238" cy="481013"/>
+            <a:off x="0" y="1"/>
+            <a:ext cx="2945955" cy="494613"/>
           </a:xfrm>
           <a:prstGeom prst="rect">
             <a:avLst/>
@@ -191,8 +191,8 @@
         </p:nvSpPr>
         <p:spPr>
           <a:xfrm>
-            <a:off x="4143375" y="0"/>
-            <a:ext cx="3170238" cy="481013"/>
+            <a:off x="3850245" y="1"/>
+            <a:ext cx="2945955" cy="494613"/>
           </a:xfrm>
           <a:prstGeom prst="rect">
             <a:avLst/>
@@ -226,8 +226,8 @@
         </p:nvSpPr>
         <p:spPr>
           <a:xfrm>
-            <a:off x="0" y="9120188"/>
-            <a:ext cx="3170238" cy="481012"/>
+            <a:off x="0" y="9378051"/>
+            <a:ext cx="2945955" cy="494612"/>
           </a:xfrm>
           <a:prstGeom prst="rect">
             <a:avLst/>
@@ -257,8 +257,8 @@
         </p:nvSpPr>
         <p:spPr>
           <a:xfrm>
-            <a:off x="4143375" y="9120188"/>
-            <a:ext cx="3170238" cy="481012"/>
+            <a:off x="3850245" y="9378051"/>
+            <a:ext cx="2945955" cy="494612"/>
           </a:xfrm>
           <a:prstGeom prst="rect">
             <a:avLst/>
@@ -325,8 +325,8 @@
         </p:nvSpPr>
         <p:spPr>
           <a:xfrm>
-            <a:off x="0" y="0"/>
-            <a:ext cx="3170238" cy="481013"/>
+            <a:off x="0" y="1"/>
+            <a:ext cx="2945955" cy="494613"/>
           </a:xfrm>
           <a:prstGeom prst="rect">
             <a:avLst/>
@@ -356,8 +356,8 @@
         </p:nvSpPr>
         <p:spPr>
           <a:xfrm>
-            <a:off x="4143375" y="0"/>
-            <a:ext cx="3170238" cy="481013"/>
+            <a:off x="3850245" y="1"/>
+            <a:ext cx="2945955" cy="494613"/>
           </a:xfrm>
           <a:prstGeom prst="rect">
             <a:avLst/>
@@ -391,8 +391,8 @@
         </p:nvSpPr>
         <p:spPr>
           <a:xfrm>
-            <a:off x="777875" y="1200150"/>
-            <a:ext cx="5759450" cy="3240088"/>
+            <a:off x="438150" y="1233488"/>
+            <a:ext cx="5921375" cy="3332162"/>
           </a:xfrm>
           <a:prstGeom prst="rect">
             <a:avLst/>
@@ -424,8 +424,8 @@
         </p:nvSpPr>
         <p:spPr>
           <a:xfrm>
-            <a:off x="731838" y="4621213"/>
-            <a:ext cx="5851525" cy="3779837"/>
+            <a:off x="680063" y="4751873"/>
+            <a:ext cx="5437550" cy="3886708"/>
           </a:xfrm>
           <a:prstGeom prst="rect">
             <a:avLst/>
@@ -483,8 +483,8 @@
         </p:nvSpPr>
         <p:spPr>
           <a:xfrm>
-            <a:off x="0" y="9120188"/>
-            <a:ext cx="3170238" cy="481012"/>
+            <a:off x="0" y="9378051"/>
+            <a:ext cx="2945955" cy="494612"/>
           </a:xfrm>
           <a:prstGeom prst="rect">
             <a:avLst/>
@@ -514,8 +514,8 @@
         </p:nvSpPr>
         <p:spPr>
           <a:xfrm>
-            <a:off x="4143375" y="9120188"/>
-            <a:ext cx="3170238" cy="481012"/>
+            <a:off x="3850245" y="9378051"/>
+            <a:ext cx="2945955" cy="494612"/>
           </a:xfrm>
           <a:prstGeom prst="rect">
             <a:avLst/>
@@ -6397,10 +6397,10 @@
         </p:nvGrpSpPr>
         <p:grpSpPr>
           <a:xfrm>
-            <a:off x="429768" y="2711011"/>
-            <a:ext cx="932688" cy="837439"/>
-            <a:chOff x="3291840" y="2247901"/>
-            <a:chExt cx="932688" cy="837439"/>
+            <a:off x="327660" y="2706979"/>
+            <a:ext cx="1056704" cy="868428"/>
+            <a:chOff x="3035808" y="2073460"/>
+            <a:chExt cx="1056704" cy="868428"/>
           </a:xfrm>
         </p:grpSpPr>
         <p:pic>
@@ -6424,46 +6424,7 @@
           </p:blipFill>
           <p:spPr bwMode="auto">
             <a:xfrm flipV="1">
-              <a:off x="3328416" y="2353057"/>
-              <a:ext cx="438912" cy="420624"/>
-            </a:xfrm>
-            <a:prstGeom prst="rect">
-              <a:avLst/>
-            </a:prstGeom>
-            <a:noFill/>
-            <a:extLst>
-              <a:ext uri="{909E8E84-426E-40DD-AFC4-6F175D3DCCD1}">
-                <a14:hiddenFill xmlns:a14="http://schemas.microsoft.com/office/drawing/2010/main">
-                  <a:solidFill>
-                    <a:srgbClr val="FFFFFF"/>
-                  </a:solidFill>
-                </a14:hiddenFill>
-              </a:ext>
-            </a:extLst>
-          </p:spPr>
-        </p:pic>
-        <p:pic>
-          <p:nvPicPr>
-            <p:cNvPr id="6" name="Picture 4" descr="Image result for features machine learning icon"/>
-            <p:cNvPicPr>
-              <a:picLocks noChangeAspect="1" noChangeArrowheads="1"/>
-            </p:cNvPicPr>
-            <p:nvPr/>
-          </p:nvPicPr>
-          <p:blipFill rotWithShape="1">
-            <a:blip r:embed="rId2" cstate="print">
-              <a:extLst>
-                <a:ext uri="{28A0092B-C50C-407E-A947-70E740481C1C}">
-                  <a14:useLocalDpi xmlns:a14="http://schemas.microsoft.com/office/drawing/2010/main" val="0"/>
-                </a:ext>
-              </a:extLst>
-            </a:blip>
-            <a:srcRect l="8415" t="3053" r="8422" b="17250"/>
-            <a:stretch/>
-          </p:blipFill>
-          <p:spPr bwMode="auto">
-            <a:xfrm flipV="1">
-              <a:off x="3547872" y="2563369"/>
+              <a:off x="3255264" y="2170004"/>
               <a:ext cx="438912" cy="420624"/>
             </a:xfrm>
             <a:prstGeom prst="rect">
@@ -6502,7 +6463,7 @@
           </p:blipFill>
           <p:spPr bwMode="auto">
             <a:xfrm flipV="1">
-              <a:off x="3657600" y="2247901"/>
+              <a:off x="3653600" y="2073460"/>
               <a:ext cx="438912" cy="420624"/>
             </a:xfrm>
             <a:prstGeom prst="rect">
@@ -6541,7 +6502,7 @@
           </p:blipFill>
           <p:spPr bwMode="auto">
             <a:xfrm flipV="1">
-              <a:off x="3785616" y="2510791"/>
+              <a:off x="3547872" y="2469251"/>
               <a:ext cx="438912" cy="420624"/>
             </a:xfrm>
             <a:prstGeom prst="rect">
@@ -6580,7 +6541,7 @@
           </p:blipFill>
           <p:spPr bwMode="auto">
             <a:xfrm flipV="1">
-              <a:off x="3291840" y="2664716"/>
+              <a:off x="3035808" y="2521264"/>
               <a:ext cx="438912" cy="420624"/>
             </a:xfrm>
             <a:prstGeom prst="rect">
@@ -6623,7 +6584,6 @@
           <a:p>
             <a:r>
               <a:rPr lang="en-US" b="1" dirty="0">
-                <a:latin typeface="Times New Roman" panose="02020603050405020304" pitchFamily="18" charset="0"/>
                 <a:cs typeface="Times New Roman" panose="02020603050405020304" pitchFamily="18" charset="0"/>
               </a:rPr>
               <a:t>Features</a:t>

</xml_diff>